<commit_message>
Added a condition to target readers
</commit_message>
<xml_diff>
--- a/survey.pptx
+++ b/survey.pptx
@@ -4848,6 +4848,14 @@
             <a:r>
               <a:rPr lang="ja-JP" altLang="en-US"/>
               <a:t>の学生</a:t>
+            </a:r>
+            <a:endParaRPr lang="en-US" altLang="ja-JP" dirty="0"/>
+          </a:p>
+          <a:p>
+            <a:pPr lvl="1"/>
+            <a:r>
+              <a:rPr lang="ja-JP" altLang="en-US"/>
+              <a:t>前提として，研究テーマがある程度決まっており，関連する教科書程度は既に読み終えている</a:t>
             </a:r>
             <a:endParaRPr lang="en-US" altLang="ja-JP" dirty="0"/>
           </a:p>

</xml_diff>